<commit_message>
add to git commit -m
</commit_message>
<xml_diff>
--- a/git_images.pptx
+++ b/git_images.pptx
@@ -3914,10 +3914,10 @@
       </p:sp>
       <p:sp>
         <p:nvSpPr>
-          <p:cNvPr id="14" name="テキスト ボックス 13">
-            <a:extLst>
-              <a:ext uri="{FF2B5EF4-FFF2-40B4-BE49-F238E27FC236}">
-                <a16:creationId xmlns:a16="http://schemas.microsoft.com/office/drawing/2014/main" id="{EDC118CD-03E4-D93C-337D-777112049A62}"/>
+          <p:cNvPr id="20" name="テキスト ボックス 19">
+            <a:extLst>
+              <a:ext uri="{FF2B5EF4-FFF2-40B4-BE49-F238E27FC236}">
+                <a16:creationId xmlns:a16="http://schemas.microsoft.com/office/drawing/2014/main" id="{B7A7F98C-8BC6-5D87-4F99-946316394396}"/>
               </a:ext>
             </a:extLst>
           </p:cNvPr>
@@ -3926,8 +3926,8 @@
         </p:nvSpPr>
         <p:spPr>
           <a:xfrm>
-            <a:off x="3603010" y="3751650"/>
-            <a:ext cx="873957" cy="369332"/>
+            <a:off x="3603010" y="1631105"/>
+            <a:ext cx="1308371" cy="369332"/>
           </a:xfrm>
           <a:prstGeom prst="rect">
             <a:avLst/>
@@ -3942,132 +3942,54 @@
           <a:p>
             <a:r>
               <a:rPr kumimoji="1" lang="en-US" altLang="ja-JP" dirty="0"/>
-              <a:t>git diff</a:t>
+              <a:t>git commit</a:t>
             </a:r>
             <a:endParaRPr kumimoji="1" lang="ja-JP" altLang="en-US"/>
           </a:p>
         </p:txBody>
       </p:sp>
-      <p:cxnSp>
-        <p:nvCxnSpPr>
-          <p:cNvPr id="16" name="直線矢印コネクタ 15">
-            <a:extLst>
-              <a:ext uri="{FF2B5EF4-FFF2-40B4-BE49-F238E27FC236}">
-                <a16:creationId xmlns:a16="http://schemas.microsoft.com/office/drawing/2014/main" id="{F52C1458-C781-946D-259E-3FA5F052E333}"/>
-              </a:ext>
-            </a:extLst>
-          </p:cNvPr>
-          <p:cNvCxnSpPr>
-            <a:cxnSpLocks/>
-          </p:cNvCxnSpPr>
+      <p:sp>
+        <p:nvSpPr>
+          <p:cNvPr id="21" name="上矢印 20">
+            <a:extLst>
+              <a:ext uri="{FF2B5EF4-FFF2-40B4-BE49-F238E27FC236}">
+                <a16:creationId xmlns:a16="http://schemas.microsoft.com/office/drawing/2014/main" id="{F0C3F8C2-AF38-4B31-2D7B-F4B30A34078F}"/>
+              </a:ext>
+            </a:extLst>
+          </p:cNvPr>
+          <p:cNvSpPr/>
           <p:nvPr/>
-        </p:nvCxnSpPr>
+        </p:nvSpPr>
         <p:spPr>
           <a:xfrm>
-            <a:off x="3130062" y="3602341"/>
-            <a:ext cx="0" cy="667950"/>
+            <a:off x="2790092" y="1486872"/>
+            <a:ext cx="484632" cy="657797"/>
           </a:xfrm>
-          <a:prstGeom prst="straightConnector1">
+          <a:prstGeom prst="upArrow">
             <a:avLst/>
           </a:prstGeom>
-          <a:ln>
-            <a:headEnd type="triangle"/>
-            <a:tailEnd type="triangle"/>
-          </a:ln>
         </p:spPr>
         <p:style>
           <a:lnRef idx="2">
-            <a:schemeClr val="accent1"/>
+            <a:schemeClr val="accent1">
+              <a:shade val="15000"/>
+            </a:schemeClr>
           </a:lnRef>
-          <a:fillRef idx="0">
+          <a:fillRef idx="1">
             <a:schemeClr val="accent1"/>
           </a:fillRef>
-          <a:effectRef idx="1">
+          <a:effectRef idx="0">
             <a:schemeClr val="accent1"/>
           </a:effectRef>
           <a:fontRef idx="minor">
-            <a:schemeClr val="tx1"/>
+            <a:schemeClr val="lt1"/>
           </a:fontRef>
         </p:style>
-      </p:cxnSp>
-      <p:cxnSp>
-        <p:nvCxnSpPr>
-          <p:cNvPr id="19" name="直線矢印コネクタ 18">
-            <a:extLst>
-              <a:ext uri="{FF2B5EF4-FFF2-40B4-BE49-F238E27FC236}">
-                <a16:creationId xmlns:a16="http://schemas.microsoft.com/office/drawing/2014/main" id="{3E277F81-9E0F-F5F5-5A26-80F94386F484}"/>
-              </a:ext>
-            </a:extLst>
-          </p:cNvPr>
-          <p:cNvCxnSpPr>
-            <a:cxnSpLocks/>
-          </p:cNvCxnSpPr>
-          <p:nvPr/>
-        </p:nvCxnSpPr>
-        <p:spPr>
-          <a:xfrm>
-            <a:off x="3130062" y="1482910"/>
-            <a:ext cx="0" cy="667950"/>
-          </a:xfrm>
-          <a:prstGeom prst="straightConnector1">
-            <a:avLst/>
-          </a:prstGeom>
-          <a:ln>
-            <a:headEnd type="triangle"/>
-            <a:tailEnd type="triangle"/>
-          </a:ln>
-        </p:spPr>
-        <p:style>
-          <a:lnRef idx="2">
-            <a:schemeClr val="accent1"/>
-          </a:lnRef>
-          <a:fillRef idx="0">
-            <a:schemeClr val="accent1"/>
-          </a:fillRef>
-          <a:effectRef idx="1">
-            <a:schemeClr val="accent1"/>
-          </a:effectRef>
-          <a:fontRef idx="minor">
-            <a:schemeClr val="tx1"/>
-          </a:fontRef>
-        </p:style>
-      </p:cxnSp>
-      <p:sp>
-        <p:nvSpPr>
-          <p:cNvPr id="20" name="テキスト ボックス 19">
-            <a:extLst>
-              <a:ext uri="{FF2B5EF4-FFF2-40B4-BE49-F238E27FC236}">
-                <a16:creationId xmlns:a16="http://schemas.microsoft.com/office/drawing/2014/main" id="{B7A7F98C-8BC6-5D87-4F99-946316394396}"/>
-              </a:ext>
-            </a:extLst>
-          </p:cNvPr>
-          <p:cNvSpPr txBox="1"/>
-          <p:nvPr/>
-        </p:nvSpPr>
-        <p:spPr>
-          <a:xfrm>
-            <a:off x="3603010" y="1631105"/>
-            <a:ext cx="2037737" cy="369332"/>
-          </a:xfrm>
-          <a:prstGeom prst="rect">
-            <a:avLst/>
-          </a:prstGeom>
-          <a:noFill/>
-        </p:spPr>
-        <p:txBody>
-          <a:bodyPr wrap="none" rtlCol="0">
-            <a:spAutoFit/>
-          </a:bodyPr>
-          <a:lstStyle/>
-          <a:p>
-            <a:r>
-              <a:rPr kumimoji="1" lang="en-US" altLang="ja-JP" dirty="0"/>
-              <a:t>git diff --</a:t>
-            </a:r>
-            <a:r>
-              <a:rPr kumimoji="1" lang="en-US" altLang="ja-JP" dirty="0" err="1"/>
-              <a:t>chached</a:t>
-            </a:r>
+        <p:txBody>
+          <a:bodyPr rtlCol="0" anchor="ctr"/>
+          <a:lstStyle/>
+          <a:p>
+            <a:pPr algn="ctr"/>
             <a:endParaRPr kumimoji="1" lang="ja-JP" altLang="en-US"/>
           </a:p>
         </p:txBody>

</xml_diff>